<commit_message>
Update Electric Vehicles ppt Fall 2024.pptx
updated
</commit_message>
<xml_diff>
--- a/Electric Vehicles ppt Fall 2024.pptx
+++ b/Electric Vehicles ppt Fall 2024.pptx
@@ -5,14 +5,14 @@
     <p:sldMasterId id="2147483699" r:id="rId1"/>
   </p:sldMasterIdLst>
   <p:notesMasterIdLst>
-    <p:notesMasterId r:id="rId19"/>
+    <p:notesMasterId r:id="rId17"/>
   </p:notesMasterIdLst>
   <p:sldIdLst>
     <p:sldId id="264" r:id="rId2"/>
     <p:sldId id="269" r:id="rId3"/>
     <p:sldId id="270" r:id="rId4"/>
-    <p:sldId id="267" r:id="rId5"/>
-    <p:sldId id="265" r:id="rId6"/>
+    <p:sldId id="265" r:id="rId5"/>
+    <p:sldId id="267" r:id="rId6"/>
     <p:sldId id="276" r:id="rId7"/>
     <p:sldId id="268" r:id="rId8"/>
     <p:sldId id="278" r:id="rId9"/>
@@ -20,11 +20,9 @@
     <p:sldId id="279" r:id="rId11"/>
     <p:sldId id="280" r:id="rId12"/>
     <p:sldId id="275" r:id="rId13"/>
-    <p:sldId id="277" r:id="rId14"/>
-    <p:sldId id="281" r:id="rId15"/>
-    <p:sldId id="282" r:id="rId16"/>
-    <p:sldId id="283" r:id="rId17"/>
-    <p:sldId id="284" r:id="rId18"/>
+    <p:sldId id="282" r:id="rId14"/>
+    <p:sldId id="283" r:id="rId15"/>
+    <p:sldId id="284" r:id="rId16"/>
   </p:sldIdLst>
   <p:sldSz cx="12192000" cy="6858000"/>
   <p:notesSz cx="6858000" cy="9144000"/>
@@ -213,7 +211,7 @@
           <a:p>
             <a:fld id="{2DFFB7CA-09EA-4E9A-89F4-A1B4B893CAE0}" type="datetimeFigureOut">
               <a:rPr lang="en-US" smtClean="0"/>
-              <a:t>11/15/2024</a:t>
+              <a:t>11/17/2024</a:t>
             </a:fld>
             <a:endParaRPr lang="en-US"/>
           </a:p>
@@ -613,7 +611,7 @@
           <a:p>
             <a:fld id="{AE3425CA-4B9D-4420-BB9E-C250DB30E421}" type="datetime1">
               <a:rPr lang="en-US" smtClean="0"/>
-              <a:t>11/15/2024</a:t>
+              <a:t>11/17/2024</a:t>
             </a:fld>
             <a:endParaRPr lang="en-US"/>
           </a:p>
@@ -900,7 +898,7 @@
           <a:p>
             <a:fld id="{6EF7C3A7-D6F6-4D38-A7C3-B72967BB81A6}" type="datetime1">
               <a:rPr lang="en-US" smtClean="0"/>
-              <a:t>11/15/2024</a:t>
+              <a:t>11/17/2024</a:t>
             </a:fld>
             <a:endParaRPr lang="en-US"/>
           </a:p>
@@ -1093,7 +1091,7 @@
           <a:p>
             <a:fld id="{6EF7C3A7-D6F6-4D38-A7C3-B72967BB81A6}" type="datetime1">
               <a:rPr lang="en-US" smtClean="0"/>
-              <a:t>11/15/2024</a:t>
+              <a:t>11/17/2024</a:t>
             </a:fld>
             <a:endParaRPr lang="en-US"/>
           </a:p>
@@ -1355,7 +1353,7 @@
           <a:p>
             <a:fld id="{6EF7C3A7-D6F6-4D38-A7C3-B72967BB81A6}" type="datetime1">
               <a:rPr lang="en-US" smtClean="0"/>
-              <a:t>11/15/2024</a:t>
+              <a:t>11/17/2024</a:t>
             </a:fld>
             <a:endParaRPr lang="en-US"/>
           </a:p>
@@ -1780,7 +1778,7 @@
           <a:p>
             <a:fld id="{6EF7C3A7-D6F6-4D38-A7C3-B72967BB81A6}" type="datetime1">
               <a:rPr lang="en-US" smtClean="0"/>
-              <a:t>11/15/2024</a:t>
+              <a:t>11/17/2024</a:t>
             </a:fld>
             <a:endParaRPr lang="en-US"/>
           </a:p>
@@ -2327,7 +2325,7 @@
           <a:p>
             <a:fld id="{6EF7C3A7-D6F6-4D38-A7C3-B72967BB81A6}" type="datetime1">
               <a:rPr lang="en-US" smtClean="0"/>
-              <a:t>11/15/2024</a:t>
+              <a:t>11/17/2024</a:t>
             </a:fld>
             <a:endParaRPr lang="en-US"/>
           </a:p>
@@ -3168,7 +3166,7 @@
           <a:p>
             <a:fld id="{6EF7C3A7-D6F6-4D38-A7C3-B72967BB81A6}" type="datetime1">
               <a:rPr lang="en-US" smtClean="0"/>
-              <a:t>11/15/2024</a:t>
+              <a:t>11/17/2024</a:t>
             </a:fld>
             <a:endParaRPr lang="en-US"/>
           </a:p>
@@ -3339,7 +3337,7 @@
           <a:p>
             <a:fld id="{6A14B861-3779-4E37-8DF0-E9EB3EA96210}" type="datetime1">
               <a:rPr lang="en-US" smtClean="0"/>
-              <a:t>11/15/2024</a:t>
+              <a:t>11/17/2024</a:t>
             </a:fld>
             <a:endParaRPr lang="en-US"/>
           </a:p>
@@ -3523,7 +3521,7 @@
           <a:p>
             <a:fld id="{53E38388-E864-4553-9937-AE9FC5E50CFC}" type="datetime1">
               <a:rPr lang="en-US" smtClean="0"/>
-              <a:t>11/15/2024</a:t>
+              <a:t>11/17/2024</a:t>
             </a:fld>
             <a:endParaRPr lang="en-US"/>
           </a:p>
@@ -3693,7 +3691,7 @@
           <a:p>
             <a:fld id="{62751E1E-C50D-4FD4-8B1E-ECD78340D9AB}" type="datetime1">
               <a:rPr lang="en-US" smtClean="0"/>
-              <a:t>11/15/2024</a:t>
+              <a:t>11/17/2024</a:t>
             </a:fld>
             <a:endParaRPr lang="en-US"/>
           </a:p>
@@ -3941,7 +3939,7 @@
           <a:p>
             <a:fld id="{43C83AFB-9E54-459E-8C6D-0913AC3BA5D7}" type="datetime1">
               <a:rPr lang="en-US" smtClean="0"/>
-              <a:t>11/15/2024</a:t>
+              <a:t>11/17/2024</a:t>
             </a:fld>
             <a:endParaRPr lang="en-US"/>
           </a:p>
@@ -4178,7 +4176,7 @@
           <a:p>
             <a:fld id="{F10144B6-0CA7-46BA-A00B-1E68E5C3ED0C}" type="datetime1">
               <a:rPr lang="en-US" smtClean="0"/>
-              <a:t>11/15/2024</a:t>
+              <a:t>11/17/2024</a:t>
             </a:fld>
             <a:endParaRPr lang="en-US"/>
           </a:p>
@@ -4551,7 +4549,7 @@
           <a:p>
             <a:fld id="{0051F549-537C-41EC-B9CC-5B6A9AC2A6A7}" type="datetime1">
               <a:rPr lang="en-US" smtClean="0"/>
-              <a:t>11/15/2024</a:t>
+              <a:t>11/17/2024</a:t>
             </a:fld>
             <a:endParaRPr lang="en-US"/>
           </a:p>
@@ -4669,7 +4667,7 @@
           <a:p>
             <a:fld id="{952F8D56-3D0E-48B8-8218-1F3A06A96C62}" type="datetime1">
               <a:rPr lang="en-US" smtClean="0"/>
-              <a:t>11/15/2024</a:t>
+              <a:t>11/17/2024</a:t>
             </a:fld>
             <a:endParaRPr lang="en-US"/>
           </a:p>
@@ -4764,7 +4762,7 @@
           <a:p>
             <a:fld id="{E8EC309E-27D4-401F-A74A-DEA16C7B51DC}" type="datetime1">
               <a:rPr lang="en-US" smtClean="0"/>
-              <a:t>11/15/2024</a:t>
+              <a:t>11/17/2024</a:t>
             </a:fld>
             <a:endParaRPr lang="en-US"/>
           </a:p>
@@ -5015,7 +5013,7 @@
           <a:p>
             <a:fld id="{6DEA2B81-2BC3-42D7-B67D-05C685AA80AD}" type="datetime1">
               <a:rPr lang="en-US" smtClean="0"/>
-              <a:t>11/15/2024</a:t>
+              <a:t>11/17/2024</a:t>
             </a:fld>
             <a:endParaRPr lang="en-US"/>
           </a:p>
@@ -5302,7 +5300,7 @@
           <a:p>
             <a:fld id="{F0DB8F2B-E487-4905-B553-FB649F2B6F23}" type="datetime1">
               <a:rPr lang="en-US" smtClean="0"/>
-              <a:t>11/15/2024</a:t>
+              <a:t>11/17/2024</a:t>
             </a:fld>
             <a:endParaRPr lang="en-US"/>
           </a:p>
@@ -5515,7 +5513,7 @@
           <a:p>
             <a:fld id="{6EF7C3A7-D6F6-4D38-A7C3-B72967BB81A6}" type="datetime1">
               <a:rPr lang="en-US" smtClean="0"/>
-              <a:t>11/15/2024</a:t>
+              <a:t>11/17/2024</a:t>
             </a:fld>
             <a:endParaRPr lang="en-US"/>
           </a:p>
@@ -6640,7 +6638,12 @@
             <p:ph type="title"/>
           </p:nvPr>
         </p:nvSpPr>
-        <p:spPr/>
+        <p:spPr>
+          <a:xfrm>
+            <a:off x="913796" y="403639"/>
+            <a:ext cx="10353761" cy="1326321"/>
+          </a:xfrm>
+        </p:spPr>
         <p:txBody>
           <a:bodyPr>
             <a:normAutofit/>
@@ -6670,24 +6673,78 @@
             <p:ph idx="1"/>
           </p:nvPr>
         </p:nvSpPr>
-        <p:spPr/>
-        <p:txBody>
-          <a:bodyPr/>
+        <p:spPr>
+          <a:xfrm>
+            <a:off x="913795" y="1593788"/>
+            <a:ext cx="10353762" cy="4697541"/>
+          </a:xfrm>
+        </p:spPr>
+        <p:txBody>
+          <a:bodyPr>
+            <a:normAutofit/>
+          </a:bodyPr>
           <a:lstStyle/>
           <a:p>
             <a:r>
-              <a:rPr lang="en-US" dirty="0"/>
+              <a:rPr lang="en-US" sz="1900" dirty="0"/>
               <a:t>Continuous data --Supervised machine learning algorithm, OLS (ordinary least square), provides the linear relationship between the socio-economic factors </a:t>
             </a:r>
           </a:p>
           <a:p>
             <a:r>
-              <a:rPr lang="en-US" dirty="0"/>
+              <a:rPr lang="en-US" sz="1900" dirty="0"/>
               <a:t>For model forecasting, the dataset is divided into two subsets: a training set and a testing set, using an 80/20 split. </a:t>
             </a:r>
           </a:p>
-        </p:txBody>
-      </p:sp>
+          <a:p>
+            <a:r>
+              <a:rPr lang="en-US" sz="2000" dirty="0">
+                <a:effectLst/>
+                <a:latin typeface="Times New Roman" panose="02020603050405020304" pitchFamily="18" charset="0"/>
+                <a:ea typeface="Aptos" panose="020B0004020202020204" pitchFamily="34" charset="0"/>
+              </a:rPr>
+              <a:t>Correlation Matrix</a:t>
+            </a:r>
+            <a:endParaRPr lang="en-US" sz="1900" dirty="0"/>
+          </a:p>
+          <a:p>
+            <a:endParaRPr lang="en-US" sz="1900" dirty="0"/>
+          </a:p>
+          <a:p>
+            <a:endParaRPr lang="en-US" dirty="0"/>
+          </a:p>
+        </p:txBody>
+      </p:sp>
+      <p:pic>
+        <p:nvPicPr>
+          <p:cNvPr id="4" name="Picture 3">
+            <a:extLst>
+              <a:ext uri="{FF2B5EF4-FFF2-40B4-BE49-F238E27FC236}">
+                <a16:creationId xmlns:a16="http://schemas.microsoft.com/office/drawing/2014/main" id="{C6FABDAF-AFB2-2B02-E14D-14ABF38EA956}"/>
+              </a:ext>
+            </a:extLst>
+          </p:cNvPr>
+          <p:cNvPicPr>
+            <a:picLocks noChangeAspect="1"/>
+          </p:cNvPicPr>
+          <p:nvPr/>
+        </p:nvPicPr>
+        <p:blipFill>
+          <a:blip r:embed="rId2"/>
+          <a:stretch>
+            <a:fillRect/>
+          </a:stretch>
+        </p:blipFill>
+        <p:spPr>
+          <a:xfrm>
+            <a:off x="3228418" y="3213279"/>
+            <a:ext cx="8049787" cy="2852670"/>
+          </a:xfrm>
+          <a:prstGeom prst="rect">
+            <a:avLst/>
+          </a:prstGeom>
+        </p:spPr>
+      </p:pic>
     </p:spTree>
     <p:extLst>
       <p:ext uri="{BB962C8B-B14F-4D97-AF65-F5344CB8AC3E}">
@@ -6706,291 +6763,6 @@
   <p:cSld>
     <p:spTree>
       <p:nvGrpSpPr>
-        <p:cNvPr id="1" name="">
-          <a:extLst>
-            <a:ext uri="{FF2B5EF4-FFF2-40B4-BE49-F238E27FC236}">
-              <a16:creationId xmlns:a16="http://schemas.microsoft.com/office/drawing/2014/main" id="{7D224B47-A729-E58A-893E-FF6F457D8289}"/>
-            </a:ext>
-          </a:extLst>
-        </p:cNvPr>
-        <p:cNvGrpSpPr/>
-        <p:nvPr/>
-      </p:nvGrpSpPr>
-      <p:grpSpPr>
-        <a:xfrm>
-          <a:off x="0" y="0"/>
-          <a:ext cx="0" cy="0"/>
-          <a:chOff x="0" y="0"/>
-          <a:chExt cx="0" cy="0"/>
-        </a:xfrm>
-      </p:grpSpPr>
-      <p:sp>
-        <p:nvSpPr>
-          <p:cNvPr id="2" name="Title 1">
-            <a:extLst>
-              <a:ext uri="{FF2B5EF4-FFF2-40B4-BE49-F238E27FC236}">
-                <a16:creationId xmlns:a16="http://schemas.microsoft.com/office/drawing/2014/main" id="{70E16850-5B80-FD96-218C-D2E740697232}"/>
-              </a:ext>
-            </a:extLst>
-          </p:cNvPr>
-          <p:cNvSpPr>
-            <a:spLocks noGrp="1"/>
-          </p:cNvSpPr>
-          <p:nvPr>
-            <p:ph type="title"/>
-          </p:nvPr>
-        </p:nvSpPr>
-        <p:spPr/>
-        <p:txBody>
-          <a:bodyPr>
-            <a:normAutofit/>
-          </a:bodyPr>
-          <a:lstStyle/>
-          <a:p>
-            <a:r>
-              <a:rPr lang="en-US" sz="2500" dirty="0"/>
-              <a:t>MSE (Mean Squared Error) and RMSE (Root Mean Squared Error) </a:t>
-            </a:r>
-            <a:r>
-              <a:rPr lang="en-US" sz="2500" dirty="0" err="1"/>
-              <a:t>valueS</a:t>
-            </a:r>
-            <a:endParaRPr lang="en-US" sz="2500" dirty="0"/>
-          </a:p>
-        </p:txBody>
-      </p:sp>
-      <p:sp>
-        <p:nvSpPr>
-          <p:cNvPr id="3" name="Content Placeholder 2">
-            <a:extLst>
-              <a:ext uri="{FF2B5EF4-FFF2-40B4-BE49-F238E27FC236}">
-                <a16:creationId xmlns:a16="http://schemas.microsoft.com/office/drawing/2014/main" id="{8B4BFA4E-D9D3-574C-1EBF-FECCF8B2C1F9}"/>
-              </a:ext>
-            </a:extLst>
-          </p:cNvPr>
-          <p:cNvSpPr>
-            <a:spLocks noGrp="1"/>
-          </p:cNvSpPr>
-          <p:nvPr>
-            <p:ph idx="1"/>
-          </p:nvPr>
-        </p:nvSpPr>
-        <p:spPr/>
-        <p:txBody>
-          <a:bodyPr>
-            <a:normAutofit/>
-          </a:bodyPr>
-          <a:lstStyle/>
-          <a:p>
-            <a:pPr marL="0" indent="0">
-              <a:buNone/>
-            </a:pPr>
-            <a:r>
-              <a:rPr lang="en-US" dirty="0"/>
-              <a:t>Model's Performance:</a:t>
-            </a:r>
-          </a:p>
-          <a:p>
-            <a:r>
-              <a:rPr lang="en-US" dirty="0" err="1"/>
-              <a:t>KFold</a:t>
-            </a:r>
-            <a:r>
-              <a:rPr lang="en-US" dirty="0"/>
-              <a:t> MSE train:  97704.880349    &gt;     </a:t>
-            </a:r>
-            <a:r>
-              <a:rPr lang="en-US" dirty="0" err="1"/>
-              <a:t>KFold</a:t>
-            </a:r>
-            <a:r>
-              <a:rPr lang="en-US" dirty="0"/>
-              <a:t> MSE test:  854.920559</a:t>
-            </a:r>
-          </a:p>
-          <a:p>
-            <a:r>
-              <a:rPr lang="en-US" dirty="0" err="1"/>
-              <a:t>KFold</a:t>
-            </a:r>
-            <a:r>
-              <a:rPr lang="en-US" dirty="0"/>
-              <a:t> RMSE train :  312.577799      &gt;    </a:t>
-            </a:r>
-            <a:r>
-              <a:rPr lang="en-US" dirty="0" err="1"/>
-              <a:t>KFold</a:t>
-            </a:r>
-            <a:r>
-              <a:rPr lang="en-US" dirty="0"/>
-              <a:t> RMSE test:  29.239025</a:t>
-            </a:r>
-          </a:p>
-          <a:p>
-            <a:endParaRPr lang="en-US" dirty="0"/>
-          </a:p>
-          <a:p>
-            <a:r>
-              <a:rPr lang="en-US" dirty="0"/>
-              <a:t>OLS MSE train:  2216372.524527     &gt;    OLS MSE test:  7891.039539</a:t>
-            </a:r>
-          </a:p>
-          <a:p>
-            <a:r>
-              <a:rPr lang="en-US" dirty="0"/>
-              <a:t>OLS RMSE train:  1488.748644          &gt;   OLS RMSE test:  88.831523</a:t>
-            </a:r>
-          </a:p>
-          <a:p>
-            <a:endParaRPr lang="en-US" dirty="0"/>
-          </a:p>
-          <a:p>
-            <a:endParaRPr lang="en-US" dirty="0"/>
-          </a:p>
-        </p:txBody>
-      </p:sp>
-    </p:spTree>
-    <p:extLst>
-      <p:ext uri="{BB962C8B-B14F-4D97-AF65-F5344CB8AC3E}">
-        <p14:creationId xmlns:p14="http://schemas.microsoft.com/office/powerpoint/2010/main" val="1613134881"/>
-      </p:ext>
-    </p:extLst>
-  </p:cSld>
-  <p:clrMapOvr>
-    <a:masterClrMapping/>
-  </p:clrMapOvr>
-</p:sld>
-</file>
-
-<file path=ppt/slides/slide14.xml><?xml version="1.0" encoding="utf-8"?>
-<p:sld xmlns:a="http://schemas.openxmlformats.org/drawingml/2006/main" xmlns:r="http://schemas.openxmlformats.org/officeDocument/2006/relationships" xmlns:p="http://schemas.openxmlformats.org/presentationml/2006/main">
-  <p:cSld>
-    <p:spTree>
-      <p:nvGrpSpPr>
-        <p:cNvPr id="1" name="">
-          <a:extLst>
-            <a:ext uri="{FF2B5EF4-FFF2-40B4-BE49-F238E27FC236}">
-              <a16:creationId xmlns:a16="http://schemas.microsoft.com/office/drawing/2014/main" id="{C877FCE3-27D7-6D40-D926-F54C57F9E0CB}"/>
-            </a:ext>
-          </a:extLst>
-        </p:cNvPr>
-        <p:cNvGrpSpPr/>
-        <p:nvPr/>
-      </p:nvGrpSpPr>
-      <p:grpSpPr>
-        <a:xfrm>
-          <a:off x="0" y="0"/>
-          <a:ext cx="0" cy="0"/>
-          <a:chOff x="0" y="0"/>
-          <a:chExt cx="0" cy="0"/>
-        </a:xfrm>
-      </p:grpSpPr>
-      <p:sp>
-        <p:nvSpPr>
-          <p:cNvPr id="2" name="Title 1">
-            <a:extLst>
-              <a:ext uri="{FF2B5EF4-FFF2-40B4-BE49-F238E27FC236}">
-                <a16:creationId xmlns:a16="http://schemas.microsoft.com/office/drawing/2014/main" id="{1E8927D2-77CD-23D8-BAE9-641F64607F7A}"/>
-              </a:ext>
-            </a:extLst>
-          </p:cNvPr>
-          <p:cNvSpPr>
-            <a:spLocks noGrp="1"/>
-          </p:cNvSpPr>
-          <p:nvPr>
-            <p:ph type="title"/>
-          </p:nvPr>
-        </p:nvSpPr>
-        <p:spPr/>
-        <p:txBody>
-          <a:bodyPr/>
-          <a:lstStyle/>
-          <a:p>
-            <a:r>
-              <a:rPr lang="en-US" sz="1800" dirty="0">
-                <a:effectLst/>
-                <a:latin typeface="Times New Roman" panose="02020603050405020304" pitchFamily="18" charset="0"/>
-                <a:ea typeface="Aptos" panose="020B0004020202020204" pitchFamily="34" charset="0"/>
-              </a:rPr>
-              <a:t>Correlation Matrix</a:t>
-            </a:r>
-            <a:endParaRPr lang="en-US" dirty="0"/>
-          </a:p>
-        </p:txBody>
-      </p:sp>
-      <p:sp>
-        <p:nvSpPr>
-          <p:cNvPr id="4" name="Content Placeholder 3">
-            <a:extLst>
-              <a:ext uri="{FF2B5EF4-FFF2-40B4-BE49-F238E27FC236}">
-                <a16:creationId xmlns:a16="http://schemas.microsoft.com/office/drawing/2014/main" id="{C4148F6D-128D-C6FA-31C9-1D4CA43B8F81}"/>
-              </a:ext>
-            </a:extLst>
-          </p:cNvPr>
-          <p:cNvSpPr>
-            <a:spLocks noGrp="1"/>
-          </p:cNvSpPr>
-          <p:nvPr>
-            <p:ph idx="1"/>
-          </p:nvPr>
-        </p:nvSpPr>
-        <p:spPr/>
-        <p:txBody>
-          <a:bodyPr/>
-          <a:lstStyle/>
-          <a:p>
-            <a:endParaRPr lang="en-US" dirty="0"/>
-          </a:p>
-        </p:txBody>
-      </p:sp>
-      <p:pic>
-        <p:nvPicPr>
-          <p:cNvPr id="7" name="Picture 6">
-            <a:extLst>
-              <a:ext uri="{FF2B5EF4-FFF2-40B4-BE49-F238E27FC236}">
-                <a16:creationId xmlns:a16="http://schemas.microsoft.com/office/drawing/2014/main" id="{3CDB4295-C876-F21B-4509-D9CF00BF7F29}"/>
-              </a:ext>
-            </a:extLst>
-          </p:cNvPr>
-          <p:cNvPicPr>
-            <a:picLocks noChangeAspect="1"/>
-          </p:cNvPicPr>
-          <p:nvPr/>
-        </p:nvPicPr>
-        <p:blipFill>
-          <a:blip r:embed="rId2"/>
-          <a:stretch>
-            <a:fillRect/>
-          </a:stretch>
-        </p:blipFill>
-        <p:spPr>
-          <a:xfrm>
-            <a:off x="824541" y="2202287"/>
-            <a:ext cx="10353761" cy="3387545"/>
-          </a:xfrm>
-          <a:prstGeom prst="rect">
-            <a:avLst/>
-          </a:prstGeom>
-        </p:spPr>
-      </p:pic>
-    </p:spTree>
-    <p:extLst>
-      <p:ext uri="{BB962C8B-B14F-4D97-AF65-F5344CB8AC3E}">
-        <p14:creationId xmlns:p14="http://schemas.microsoft.com/office/powerpoint/2010/main" val="1274793905"/>
-      </p:ext>
-    </p:extLst>
-  </p:cSld>
-  <p:clrMapOvr>
-    <a:masterClrMapping/>
-  </p:clrMapOvr>
-</p:sld>
-</file>
-
-<file path=ppt/slides/slide15.xml><?xml version="1.0" encoding="utf-8"?>
-<p:sld xmlns:a="http://schemas.openxmlformats.org/drawingml/2006/main" xmlns:r="http://schemas.openxmlformats.org/officeDocument/2006/relationships" xmlns:p="http://schemas.openxmlformats.org/presentationml/2006/main">
-  <p:cSld>
-    <p:spTree>
-      <p:nvGrpSpPr>
         <p:cNvPr id="1" name=""/>
         <p:cNvGrpSpPr/>
         <p:nvPr/>
@@ -7021,7 +6793,7 @@
         </p:nvSpPr>
         <p:spPr>
           <a:xfrm>
-            <a:off x="8023542" y="598874"/>
+            <a:off x="8023542" y="289778"/>
             <a:ext cx="2864091" cy="905611"/>
           </a:xfrm>
         </p:spPr>
@@ -7064,8 +6836,8 @@
         </p:blipFill>
         <p:spPr>
           <a:xfrm>
-            <a:off x="1137490" y="1317847"/>
-            <a:ext cx="6653105" cy="4740337"/>
+            <a:off x="1304367" y="602509"/>
+            <a:ext cx="6170696" cy="4396620"/>
           </a:xfrm>
           <a:prstGeom prst="rect">
             <a:avLst/>
@@ -7178,6 +6950,92 @@
               </a:rPr>
               <a:t>96.6776 is a constant value.</a:t>
             </a:r>
+          </a:p>
+        </p:txBody>
+      </p:sp>
+      <p:sp>
+        <p:nvSpPr>
+          <p:cNvPr id="5" name="TextBox 4">
+            <a:extLst>
+              <a:ext uri="{FF2B5EF4-FFF2-40B4-BE49-F238E27FC236}">
+                <a16:creationId xmlns:a16="http://schemas.microsoft.com/office/drawing/2014/main" id="{E1D1D8A7-5445-6A40-410B-F47CCE8E4E49}"/>
+              </a:ext>
+            </a:extLst>
+          </p:cNvPr>
+          <p:cNvSpPr txBox="1"/>
+          <p:nvPr/>
+        </p:nvSpPr>
+        <p:spPr>
+          <a:xfrm>
+            <a:off x="1075386" y="4977682"/>
+            <a:ext cx="6639059" cy="1246495"/>
+          </a:xfrm>
+          <a:prstGeom prst="rect">
+            <a:avLst/>
+          </a:prstGeom>
+          <a:noFill/>
+        </p:spPr>
+        <p:txBody>
+          <a:bodyPr wrap="square" rtlCol="0">
+            <a:spAutoFit/>
+          </a:bodyPr>
+          <a:lstStyle/>
+          <a:p>
+            <a:pPr marL="0" indent="0">
+              <a:buNone/>
+            </a:pPr>
+            <a:r>
+              <a:rPr lang="en-US" sz="1500" dirty="0"/>
+              <a:t>MSE (Mean Squared Error) and RMSE (Root Mean Squared Error) values</a:t>
+            </a:r>
+          </a:p>
+          <a:p>
+            <a:pPr marL="0" indent="0">
+              <a:buNone/>
+            </a:pPr>
+            <a:r>
+              <a:rPr lang="en-US" sz="1500" dirty="0"/>
+              <a:t>Model's Performance:</a:t>
+            </a:r>
+          </a:p>
+          <a:p>
+            <a:r>
+              <a:rPr lang="en-US" sz="1500" dirty="0" err="1"/>
+              <a:t>KFold</a:t>
+            </a:r>
+            <a:r>
+              <a:rPr lang="en-US" sz="1500" dirty="0"/>
+              <a:t> MSE train:  97704.880349    &gt;     </a:t>
+            </a:r>
+            <a:r>
+              <a:rPr lang="en-US" sz="1500" dirty="0" err="1"/>
+              <a:t>KFold</a:t>
+            </a:r>
+            <a:r>
+              <a:rPr lang="en-US" sz="1500" dirty="0"/>
+              <a:t> MSE test:  854.920559</a:t>
+            </a:r>
+          </a:p>
+          <a:p>
+            <a:r>
+              <a:rPr lang="en-US" sz="1500" dirty="0" err="1"/>
+              <a:t>KFold</a:t>
+            </a:r>
+            <a:r>
+              <a:rPr lang="en-US" sz="1500" dirty="0"/>
+              <a:t> RMSE train :  312.577799      &gt;    </a:t>
+            </a:r>
+            <a:r>
+              <a:rPr lang="en-US" sz="1500" dirty="0" err="1"/>
+              <a:t>KFold</a:t>
+            </a:r>
+            <a:r>
+              <a:rPr lang="en-US" sz="1500" dirty="0"/>
+              <a:t> RMSE test:  29.239025</a:t>
+            </a:r>
+          </a:p>
+          <a:p>
+            <a:endParaRPr lang="en-US" sz="1500" dirty="0"/>
           </a:p>
         </p:txBody>
       </p:sp>
@@ -7194,7 +7052,7 @@
 </p:sld>
 </file>
 
-<file path=ppt/slides/slide16.xml><?xml version="1.0" encoding="utf-8"?>
+<file path=ppt/slides/slide14.xml><?xml version="1.0" encoding="utf-8"?>
 <p:sld xmlns:a="http://schemas.openxmlformats.org/drawingml/2006/main" xmlns:r="http://schemas.openxmlformats.org/officeDocument/2006/relationships" xmlns:p="http://schemas.openxmlformats.org/presentationml/2006/main">
   <p:cSld>
     <p:spTree>
@@ -7280,7 +7138,15 @@
           <a:p>
             <a:r>
               <a:rPr lang="en-US" sz="1800" dirty="0"/>
-              <a:t>The model explains about 76% of the variance in the DV, which is a good fit. </a:t>
+              <a:t>The model explains about </a:t>
+            </a:r>
+            <a:r>
+              <a:rPr lang="en-US" sz="1800" b="1" dirty="0"/>
+              <a:t>76%</a:t>
+            </a:r>
+            <a:r>
+              <a:rPr lang="en-US" sz="1800" dirty="0"/>
+              <a:t> of the variance in the DV, which is a good fit. </a:t>
             </a:r>
           </a:p>
           <a:p>
@@ -7325,7 +7191,7 @@
 </p:sld>
 </file>
 
-<file path=ppt/slides/slide17.xml><?xml version="1.0" encoding="utf-8"?>
+<file path=ppt/slides/slide15.xml><?xml version="1.0" encoding="utf-8"?>
 <p:sld xmlns:a="http://schemas.openxmlformats.org/drawingml/2006/main" xmlns:r="http://schemas.openxmlformats.org/officeDocument/2006/relationships" xmlns:p="http://schemas.openxmlformats.org/presentationml/2006/main">
   <p:cSld>
     <p:spTree>
@@ -7849,577 +7715,6 @@
 <file path=ppt/slides/slide4.xml><?xml version="1.0" encoding="utf-8"?>
 <p:sld xmlns:a="http://schemas.openxmlformats.org/drawingml/2006/main" xmlns:r="http://schemas.openxmlformats.org/officeDocument/2006/relationships" xmlns:p="http://schemas.openxmlformats.org/presentationml/2006/main">
   <p:cSld>
-    <p:bg>
-      <p:bgPr>
-        <a:solidFill>
-          <a:schemeClr val="bg1"/>
-        </a:solidFill>
-        <a:effectLst/>
-      </p:bgPr>
-    </p:bg>
-    <p:spTree>
-      <p:nvGrpSpPr>
-        <p:cNvPr id="1" name=""/>
-        <p:cNvGrpSpPr/>
-        <p:nvPr/>
-      </p:nvGrpSpPr>
-      <p:grpSpPr>
-        <a:xfrm>
-          <a:off x="0" y="0"/>
-          <a:ext cx="0" cy="0"/>
-          <a:chOff x="0" y="0"/>
-          <a:chExt cx="0" cy="0"/>
-        </a:xfrm>
-      </p:grpSpPr>
-      <p:sp>
-        <p:nvSpPr>
-          <p:cNvPr id="11" name="Rectangle 10">
-            <a:extLst>
-              <a:ext uri="{FF2B5EF4-FFF2-40B4-BE49-F238E27FC236}">
-                <a16:creationId xmlns:a16="http://schemas.microsoft.com/office/drawing/2014/main" id="{09A5E449-B95D-46A6-9234-5477BCBAD6CE}"/>
-              </a:ext>
-              <a:ext uri="{C183D7F6-B498-43B3-948B-1728B52AA6E4}">
-                <adec:decorative xmlns:adec="http://schemas.microsoft.com/office/drawing/2017/decorative" val="1"/>
-              </a:ext>
-            </a:extLst>
-          </p:cNvPr>
-          <p:cNvSpPr>
-            <a:spLocks noGrp="1" noRot="1" noChangeAspect="1" noMove="1" noResize="1" noEditPoints="1" noAdjustHandles="1" noChangeArrowheads="1" noChangeShapeType="1" noTextEdit="1"/>
-          </p:cNvSpPr>
-          <p:nvPr>
-            <p:extLst>
-              <p:ext uri="{386F3935-93C4-4BCD-93E2-E3B085C9AB24}">
-                <p16:designElem xmlns:p16="http://schemas.microsoft.com/office/powerpoint/2015/main" val="1"/>
-              </p:ext>
-            </p:extLst>
-          </p:nvPr>
-        </p:nvSpPr>
-        <p:spPr>
-          <a:xfrm>
-            <a:off x="0" y="0"/>
-            <a:ext cx="12192000" cy="6858000"/>
-          </a:xfrm>
-          <a:prstGeom prst="rect">
-            <a:avLst/>
-          </a:prstGeom>
-          <a:ln>
-            <a:noFill/>
-          </a:ln>
-        </p:spPr>
-        <p:style>
-          <a:lnRef idx="2">
-            <a:schemeClr val="accent1">
-              <a:shade val="50000"/>
-            </a:schemeClr>
-          </a:lnRef>
-          <a:fillRef idx="1003">
-            <a:schemeClr val="dk2"/>
-          </a:fillRef>
-          <a:effectRef idx="0">
-            <a:schemeClr val="accent1"/>
-          </a:effectRef>
-          <a:fontRef idx="minor">
-            <a:schemeClr val="lt1"/>
-          </a:fontRef>
-        </p:style>
-        <p:txBody>
-          <a:bodyPr rtlCol="0" anchor="ctr"/>
-          <a:lstStyle/>
-          <a:p>
-            <a:pPr algn="ctr"/>
-            <a:endParaRPr lang="en-US"/>
-          </a:p>
-        </p:txBody>
-      </p:sp>
-      <p:sp>
-        <p:nvSpPr>
-          <p:cNvPr id="3" name="Title 2">
-            <a:extLst>
-              <a:ext uri="{FF2B5EF4-FFF2-40B4-BE49-F238E27FC236}">
-                <a16:creationId xmlns:a16="http://schemas.microsoft.com/office/drawing/2014/main" id="{585BE8AC-7C70-DFA1-EE3F-FA4E60F52E2D}"/>
-              </a:ext>
-            </a:extLst>
-          </p:cNvPr>
-          <p:cNvSpPr>
-            <a:spLocks noGrp="1"/>
-          </p:cNvSpPr>
-          <p:nvPr>
-            <p:ph type="title"/>
-          </p:nvPr>
-        </p:nvSpPr>
-        <p:spPr>
-          <a:xfrm>
-            <a:off x="2801180" y="296216"/>
-            <a:ext cx="1711437" cy="289771"/>
-          </a:xfrm>
-        </p:spPr>
-        <p:txBody>
-          <a:bodyPr vert="horz" lIns="91440" tIns="45720" rIns="91440" bIns="45720" rtlCol="0" anchor="ctr">
-            <a:noAutofit/>
-          </a:bodyPr>
-          <a:lstStyle/>
-          <a:p>
-            <a:r>
-              <a:rPr lang="en-US" sz="2200" dirty="0">
-                <a:solidFill>
-                  <a:srgbClr val="FFFFFF"/>
-                </a:solidFill>
-              </a:rPr>
-              <a:t>US Map</a:t>
-            </a:r>
-          </a:p>
-        </p:txBody>
-      </p:sp>
-      <p:sp>
-        <p:nvSpPr>
-          <p:cNvPr id="13" name="Rectangle 12">
-            <a:extLst>
-              <a:ext uri="{FF2B5EF4-FFF2-40B4-BE49-F238E27FC236}">
-                <a16:creationId xmlns:a16="http://schemas.microsoft.com/office/drawing/2014/main" id="{57B113FE-00ED-4DFD-B853-285DBAE33FCF}"/>
-              </a:ext>
-              <a:ext uri="{C183D7F6-B498-43B3-948B-1728B52AA6E4}">
-                <adec:decorative xmlns:adec="http://schemas.microsoft.com/office/drawing/2017/decorative" val="1"/>
-              </a:ext>
-            </a:extLst>
-          </p:cNvPr>
-          <p:cNvSpPr>
-            <a:spLocks noGrp="1" noRot="1" noChangeAspect="1" noMove="1" noResize="1" noEditPoints="1" noAdjustHandles="1" noChangeArrowheads="1" noChangeShapeType="1" noTextEdit="1"/>
-          </p:cNvSpPr>
-          <p:nvPr>
-            <p:extLst>
-              <p:ext uri="{386F3935-93C4-4BCD-93E2-E3B085C9AB24}">
-                <p16:designElem xmlns:p16="http://schemas.microsoft.com/office/powerpoint/2015/main" val="1"/>
-              </p:ext>
-            </p:extLst>
-          </p:nvPr>
-        </p:nvSpPr>
-        <p:spPr>
-          <a:xfrm>
-            <a:off x="752475" y="733425"/>
-            <a:ext cx="6696075" cy="5391150"/>
-          </a:xfrm>
-          <a:prstGeom prst="rect">
-            <a:avLst/>
-          </a:prstGeom>
-          <a:solidFill>
-            <a:schemeClr val="bg1"/>
-          </a:solidFill>
-          <a:ln w="190500" cap="sq">
-            <a:solidFill>
-              <a:schemeClr val="bg1"/>
-            </a:solidFill>
-            <a:miter lim="800000"/>
-          </a:ln>
-          <a:effectLst>
-            <a:outerShdw blurRad="54991" dist="17780" dir="5400000" algn="ctr" rotWithShape="0">
-              <a:schemeClr val="bg1">
-                <a:alpha val="40000"/>
-              </a:schemeClr>
-            </a:outerShdw>
-          </a:effectLst>
-          <a:scene3d>
-            <a:camera prst="orthographicFront"/>
-            <a:lightRig rig="twoPt" dir="t">
-              <a:rot lat="0" lon="0" rev="7200000"/>
-            </a:lightRig>
-          </a:scene3d>
-          <a:sp3d>
-            <a:bevelT w="25400" h="19050"/>
-          </a:sp3d>
-        </p:spPr>
-        <p:style>
-          <a:lnRef idx="2">
-            <a:schemeClr val="accent1">
-              <a:shade val="50000"/>
-            </a:schemeClr>
-          </a:lnRef>
-          <a:fillRef idx="1">
-            <a:schemeClr val="accent1"/>
-          </a:fillRef>
-          <a:effectRef idx="0">
-            <a:schemeClr val="accent1"/>
-          </a:effectRef>
-          <a:fontRef idx="minor">
-            <a:schemeClr val="lt1"/>
-          </a:fontRef>
-        </p:style>
-        <p:txBody>
-          <a:bodyPr rtlCol="0" anchor="ctr"/>
-          <a:lstStyle/>
-          <a:p>
-            <a:pPr algn="ctr"/>
-            <a:endParaRPr lang="en-US"/>
-          </a:p>
-        </p:txBody>
-      </p:sp>
-      <p:pic>
-        <p:nvPicPr>
-          <p:cNvPr id="6" name="Content Placeholder 5">
-            <a:extLst>
-              <a:ext uri="{FF2B5EF4-FFF2-40B4-BE49-F238E27FC236}">
-                <a16:creationId xmlns:a16="http://schemas.microsoft.com/office/drawing/2014/main" id="{1597F5C0-22EE-AC6F-2993-9E93C3E27007}"/>
-              </a:ext>
-            </a:extLst>
-          </p:cNvPr>
-          <p:cNvPicPr>
-            <a:picLocks noGrp="1" noChangeAspect="1"/>
-          </p:cNvPicPr>
-          <p:nvPr>
-            <p:ph sz="half" idx="1"/>
-          </p:nvPr>
-        </p:nvPicPr>
-        <p:blipFill>
-          <a:blip r:embed="rId2"/>
-          <a:stretch>
-            <a:fillRect/>
-          </a:stretch>
-        </p:blipFill>
-        <p:spPr>
-          <a:xfrm>
-            <a:off x="1137490" y="1577111"/>
-            <a:ext cx="5914861" cy="3696788"/>
-          </a:xfrm>
-          <a:prstGeom prst="rect">
-            <a:avLst/>
-          </a:prstGeom>
-        </p:spPr>
-      </p:pic>
-      <p:sp>
-        <p:nvSpPr>
-          <p:cNvPr id="15" name="Rectangle 14">
-            <a:extLst>
-              <a:ext uri="{FF2B5EF4-FFF2-40B4-BE49-F238E27FC236}">
-                <a16:creationId xmlns:a16="http://schemas.microsoft.com/office/drawing/2014/main" id="{08CC676F-74F1-441D-9B51-42C5B87F182C}"/>
-              </a:ext>
-              <a:ext uri="{C183D7F6-B498-43B3-948B-1728B52AA6E4}">
-                <adec:decorative xmlns:adec="http://schemas.microsoft.com/office/drawing/2017/decorative" val="1"/>
-              </a:ext>
-            </a:extLst>
-          </p:cNvPr>
-          <p:cNvSpPr>
-            <a:spLocks noGrp="1" noRot="1" noChangeAspect="1" noMove="1" noResize="1" noEditPoints="1" noAdjustHandles="1" noChangeArrowheads="1" noChangeShapeType="1" noTextEdit="1"/>
-          </p:cNvSpPr>
-          <p:nvPr>
-            <p:extLst>
-              <p:ext uri="{386F3935-93C4-4BCD-93E2-E3B085C9AB24}">
-                <p16:designElem xmlns:p16="http://schemas.microsoft.com/office/powerpoint/2015/main" val="1"/>
-              </p:ext>
-            </p:extLst>
-          </p:nvPr>
-        </p:nvSpPr>
-        <p:spPr>
-          <a:xfrm>
-            <a:off x="817654" y="799817"/>
-            <a:ext cx="6565717" cy="5258367"/>
-          </a:xfrm>
-          <a:prstGeom prst="rect">
-            <a:avLst/>
-          </a:prstGeom>
-          <a:noFill/>
-          <a:ln w="12700">
-            <a:solidFill>
-              <a:srgbClr val="2A5B7F"/>
-            </a:solidFill>
-          </a:ln>
-        </p:spPr>
-        <p:style>
-          <a:lnRef idx="2">
-            <a:schemeClr val="accent1">
-              <a:shade val="50000"/>
-            </a:schemeClr>
-          </a:lnRef>
-          <a:fillRef idx="1">
-            <a:schemeClr val="accent1"/>
-          </a:fillRef>
-          <a:effectRef idx="0">
-            <a:schemeClr val="accent1"/>
-          </a:effectRef>
-          <a:fontRef idx="minor">
-            <a:schemeClr val="lt1"/>
-          </a:fontRef>
-        </p:style>
-        <p:txBody>
-          <a:bodyPr rtlCol="0" anchor="ctr"/>
-          <a:lstStyle/>
-          <a:p>
-            <a:pPr algn="ctr"/>
-            <a:endParaRPr lang="en-US"/>
-          </a:p>
-        </p:txBody>
-      </p:sp>
-      <p:sp>
-        <p:nvSpPr>
-          <p:cNvPr id="5" name="Content Placeholder 4">
-            <a:extLst>
-              <a:ext uri="{FF2B5EF4-FFF2-40B4-BE49-F238E27FC236}">
-                <a16:creationId xmlns:a16="http://schemas.microsoft.com/office/drawing/2014/main" id="{2E4A49F0-4F63-54F1-1689-0E58D6036870}"/>
-              </a:ext>
-            </a:extLst>
-          </p:cNvPr>
-          <p:cNvSpPr>
-            <a:spLocks noGrp="1"/>
-          </p:cNvSpPr>
-          <p:nvPr>
-            <p:ph sz="half" idx="2"/>
-          </p:nvPr>
-        </p:nvSpPr>
-        <p:spPr>
-          <a:xfrm>
-            <a:off x="7836793" y="656823"/>
-            <a:ext cx="3430763" cy="5556317"/>
-          </a:xfrm>
-        </p:spPr>
-        <p:txBody>
-          <a:bodyPr vert="horz" lIns="91440" tIns="45720" rIns="91440" bIns="45720" rtlCol="0">
-            <a:normAutofit/>
-          </a:bodyPr>
-          <a:lstStyle/>
-          <a:p>
-            <a:pPr marL="0" indent="0">
-              <a:buNone/>
-            </a:pPr>
-            <a:r>
-              <a:rPr lang="en-US" sz="1500" dirty="0">
-                <a:solidFill>
-                  <a:schemeClr val="bg1"/>
-                </a:solidFill>
-              </a:rPr>
-              <a:t>Unit of Analysis: Counties in USA </a:t>
-            </a:r>
-          </a:p>
-          <a:p>
-            <a:pPr marL="0" indent="0">
-              <a:buNone/>
-            </a:pPr>
-            <a:r>
-              <a:rPr lang="en-US" sz="1500" dirty="0">
-                <a:solidFill>
-                  <a:schemeClr val="bg1"/>
-                </a:solidFill>
-              </a:rPr>
-              <a:t>Counties: WA  - 39</a:t>
-            </a:r>
-          </a:p>
-          <a:p>
-            <a:pPr marL="0" indent="0">
-              <a:buNone/>
-            </a:pPr>
-            <a:r>
-              <a:rPr lang="en-US" sz="1500" dirty="0">
-                <a:solidFill>
-                  <a:schemeClr val="bg1"/>
-                </a:solidFill>
-              </a:rPr>
-              <a:t>Counties: NJ  - 21</a:t>
-            </a:r>
-          </a:p>
-          <a:p>
-            <a:pPr marL="0" indent="0">
-              <a:buNone/>
-            </a:pPr>
-            <a:r>
-              <a:rPr lang="en-US" sz="1500" dirty="0">
-                <a:solidFill>
-                  <a:schemeClr val="bg1"/>
-                </a:solidFill>
-              </a:rPr>
-              <a:t>Data </a:t>
-            </a:r>
-            <a:r>
-              <a:rPr lang="en-US" sz="1500" dirty="0" err="1">
-                <a:solidFill>
-                  <a:schemeClr val="bg1"/>
-                </a:solidFill>
-              </a:rPr>
-              <a:t>fron</a:t>
-            </a:r>
-            <a:r>
-              <a:rPr lang="en-US" sz="1500" dirty="0">
-                <a:solidFill>
-                  <a:schemeClr val="bg1"/>
-                </a:solidFill>
-              </a:rPr>
-              <a:t> year 2020 to 2022</a:t>
-            </a:r>
-          </a:p>
-          <a:p>
-            <a:pPr marL="0" indent="0">
-              <a:buNone/>
-            </a:pPr>
-            <a:endParaRPr lang="en-US" sz="1500" dirty="0">
-              <a:solidFill>
-                <a:schemeClr val="bg1"/>
-              </a:solidFill>
-            </a:endParaRPr>
-          </a:p>
-          <a:p>
-            <a:pPr marL="0" indent="0">
-              <a:buNone/>
-            </a:pPr>
-            <a:r>
-              <a:rPr lang="en-US" sz="1500" dirty="0">
-                <a:solidFill>
-                  <a:schemeClr val="bg1"/>
-                </a:solidFill>
-              </a:rPr>
-              <a:t>DV: availability of charging stations</a:t>
-            </a:r>
-          </a:p>
-          <a:p>
-            <a:pPr marL="0" indent="0">
-              <a:buNone/>
-            </a:pPr>
-            <a:r>
-              <a:rPr lang="en-US" sz="1500" dirty="0">
-                <a:solidFill>
-                  <a:schemeClr val="bg1"/>
-                </a:solidFill>
-              </a:rPr>
-              <a:t>Predictors (IV):  EV population, increased per capita income, larger population estimates, and lower unemployment rate</a:t>
-            </a:r>
-          </a:p>
-          <a:p>
-            <a:pPr marL="0" indent="0">
-              <a:buNone/>
-            </a:pPr>
-            <a:endParaRPr lang="en-US" sz="1500" dirty="0">
-              <a:solidFill>
-                <a:schemeClr val="bg1"/>
-              </a:solidFill>
-            </a:endParaRPr>
-          </a:p>
-          <a:p>
-            <a:pPr marL="0" indent="0">
-              <a:buNone/>
-            </a:pPr>
-            <a:r>
-              <a:rPr lang="en-US" sz="1500" dirty="0">
-                <a:solidFill>
-                  <a:schemeClr val="bg1"/>
-                </a:solidFill>
-              </a:rPr>
-              <a:t>Washington is about 9 times bigger than New Jersey.</a:t>
-            </a:r>
-          </a:p>
-          <a:p>
-            <a:pPr marL="0" indent="0">
-              <a:buNone/>
-            </a:pPr>
-            <a:r>
-              <a:rPr lang="en-US" sz="1500" dirty="0">
-                <a:solidFill>
-                  <a:schemeClr val="bg1"/>
-                </a:solidFill>
-              </a:rPr>
-              <a:t>New Jersey is 8.9% more expensive than Washington.</a:t>
-            </a:r>
-          </a:p>
-          <a:p>
-            <a:pPr marL="0" indent="0">
-              <a:buNone/>
-            </a:pPr>
-            <a:endParaRPr lang="en-US" sz="1500" dirty="0">
-              <a:solidFill>
-                <a:schemeClr val="bg1"/>
-              </a:solidFill>
-            </a:endParaRPr>
-          </a:p>
-        </p:txBody>
-      </p:sp>
-      <p:sp>
-        <p:nvSpPr>
-          <p:cNvPr id="7" name="TextBox 6">
-            <a:extLst>
-              <a:ext uri="{FF2B5EF4-FFF2-40B4-BE49-F238E27FC236}">
-                <a16:creationId xmlns:a16="http://schemas.microsoft.com/office/drawing/2014/main" id="{1105791B-D74A-C5E4-EBEA-C5B843DBDA93}"/>
-              </a:ext>
-            </a:extLst>
-          </p:cNvPr>
-          <p:cNvSpPr txBox="1"/>
-          <p:nvPr/>
-        </p:nvSpPr>
-        <p:spPr>
-          <a:xfrm>
-            <a:off x="784738" y="6213140"/>
-            <a:ext cx="2823881" cy="369332"/>
-          </a:xfrm>
-          <a:prstGeom prst="rect">
-            <a:avLst/>
-          </a:prstGeom>
-          <a:noFill/>
-        </p:spPr>
-        <p:txBody>
-          <a:bodyPr wrap="square" rtlCol="0">
-            <a:spAutoFit/>
-          </a:bodyPr>
-          <a:lstStyle/>
-          <a:p>
-            <a:r>
-              <a:rPr lang="en-US" sz="900" dirty="0">
-                <a:solidFill>
-                  <a:schemeClr val="bg1"/>
-                </a:solidFill>
-              </a:rPr>
-              <a:t>https://www.mylifeelsewhere.com/cost-of-living/washington-usa/new-jersey-usa</a:t>
-            </a:r>
-          </a:p>
-        </p:txBody>
-      </p:sp>
-      <p:sp>
-        <p:nvSpPr>
-          <p:cNvPr id="8" name="TextBox 7">
-            <a:extLst>
-              <a:ext uri="{FF2B5EF4-FFF2-40B4-BE49-F238E27FC236}">
-                <a16:creationId xmlns:a16="http://schemas.microsoft.com/office/drawing/2014/main" id="{E463C54E-A1C0-48AA-AE8D-D11DB5ED5B27}"/>
-              </a:ext>
-            </a:extLst>
-          </p:cNvPr>
-          <p:cNvSpPr txBox="1"/>
-          <p:nvPr/>
-        </p:nvSpPr>
-        <p:spPr>
-          <a:xfrm>
-            <a:off x="3721995" y="6213140"/>
-            <a:ext cx="3786586" cy="338554"/>
-          </a:xfrm>
-          <a:prstGeom prst="rect">
-            <a:avLst/>
-          </a:prstGeom>
-          <a:noFill/>
-        </p:spPr>
-        <p:txBody>
-          <a:bodyPr wrap="square" rtlCol="0">
-            <a:spAutoFit/>
-          </a:bodyPr>
-          <a:lstStyle/>
-          <a:p>
-            <a:r>
-              <a:rPr lang="en-US" sz="800" dirty="0">
-                <a:solidFill>
-                  <a:schemeClr val="bg1"/>
-                </a:solidFill>
-              </a:rPr>
-              <a:t>https://www.fla-shop.com/visited-states/?st=NJ%2CWA&amp;vc=1ca032&amp;uc=90cfea&amp;hc=40bfa6&amp;bc=ffffff&amp;sl=on</a:t>
-            </a:r>
-          </a:p>
-        </p:txBody>
-      </p:sp>
-    </p:spTree>
-    <p:extLst>
-      <p:ext uri="{BB962C8B-B14F-4D97-AF65-F5344CB8AC3E}">
-        <p14:creationId xmlns:p14="http://schemas.microsoft.com/office/powerpoint/2010/main" val="221288088"/>
-      </p:ext>
-    </p:extLst>
-  </p:cSld>
-  <p:clrMapOvr>
-    <a:overrideClrMapping bg1="lt1" tx1="dk1" bg2="lt2" tx2="dk2" accent1="accent1" accent2="accent2" accent3="accent3" accent4="accent4" accent5="accent5" accent6="accent6" hlink="hlink" folHlink="folHlink"/>
-  </p:clrMapOvr>
-</p:sld>
-</file>
-
-<file path=ppt/slides/slide5.xml><?xml version="1.0" encoding="utf-8"?>
-<p:sld xmlns:a="http://schemas.openxmlformats.org/drawingml/2006/main" xmlns:r="http://schemas.openxmlformats.org/officeDocument/2006/relationships" xmlns:p="http://schemas.openxmlformats.org/presentationml/2006/main">
-  <p:cSld>
     <p:spTree>
       <p:nvGrpSpPr>
         <p:cNvPr id="1" name=""/>
@@ -8553,15 +7848,7 @@
             </a:r>
             <a:r>
               <a:rPr lang="en-US" sz="1800" b="0" cap="none" dirty="0"/>
-              <a:t>: How do county’s selected socio-economic variables - </a:t>
-            </a:r>
-            <a:r>
-              <a:rPr lang="en-US" sz="1800" b="0" cap="none" dirty="0" err="1"/>
-              <a:t>ev</a:t>
-            </a:r>
-            <a:r>
-              <a:rPr lang="en-US" sz="1800" b="0" cap="none" dirty="0"/>
-              <a:t> population, per capita income, population estimates, and unemployment rates – from 2020 to 2022 influence the distribution and availability of charging stations in various counties?</a:t>
+              <a:t>: How do county’s selected socio-economic variables - EV population, per capita income, population estimates, and unemployment rates – from 2020 to 2022 influence the distribution and availability of charging stations in various counties?</a:t>
             </a:r>
           </a:p>
           <a:p>
@@ -8708,6 +7995,577 @@
       <p:bldP spid="3" grpId="0"/>
     </p:bldLst>
   </p:timing>
+</p:sld>
+</file>
+
+<file path=ppt/slides/slide5.xml><?xml version="1.0" encoding="utf-8"?>
+<p:sld xmlns:a="http://schemas.openxmlformats.org/drawingml/2006/main" xmlns:r="http://schemas.openxmlformats.org/officeDocument/2006/relationships" xmlns:p="http://schemas.openxmlformats.org/presentationml/2006/main">
+  <p:cSld>
+    <p:bg>
+      <p:bgPr>
+        <a:solidFill>
+          <a:schemeClr val="bg1"/>
+        </a:solidFill>
+        <a:effectLst/>
+      </p:bgPr>
+    </p:bg>
+    <p:spTree>
+      <p:nvGrpSpPr>
+        <p:cNvPr id="1" name=""/>
+        <p:cNvGrpSpPr/>
+        <p:nvPr/>
+      </p:nvGrpSpPr>
+      <p:grpSpPr>
+        <a:xfrm>
+          <a:off x="0" y="0"/>
+          <a:ext cx="0" cy="0"/>
+          <a:chOff x="0" y="0"/>
+          <a:chExt cx="0" cy="0"/>
+        </a:xfrm>
+      </p:grpSpPr>
+      <p:sp>
+        <p:nvSpPr>
+          <p:cNvPr id="11" name="Rectangle 10">
+            <a:extLst>
+              <a:ext uri="{FF2B5EF4-FFF2-40B4-BE49-F238E27FC236}">
+                <a16:creationId xmlns:a16="http://schemas.microsoft.com/office/drawing/2014/main" id="{09A5E449-B95D-46A6-9234-5477BCBAD6CE}"/>
+              </a:ext>
+              <a:ext uri="{C183D7F6-B498-43B3-948B-1728B52AA6E4}">
+                <adec:decorative xmlns:adec="http://schemas.microsoft.com/office/drawing/2017/decorative" val="1"/>
+              </a:ext>
+            </a:extLst>
+          </p:cNvPr>
+          <p:cNvSpPr>
+            <a:spLocks noGrp="1" noRot="1" noChangeAspect="1" noMove="1" noResize="1" noEditPoints="1" noAdjustHandles="1" noChangeArrowheads="1" noChangeShapeType="1" noTextEdit="1"/>
+          </p:cNvSpPr>
+          <p:nvPr>
+            <p:extLst>
+              <p:ext uri="{386F3935-93C4-4BCD-93E2-E3B085C9AB24}">
+                <p16:designElem xmlns:p16="http://schemas.microsoft.com/office/powerpoint/2015/main" val="1"/>
+              </p:ext>
+            </p:extLst>
+          </p:nvPr>
+        </p:nvSpPr>
+        <p:spPr>
+          <a:xfrm>
+            <a:off x="0" y="0"/>
+            <a:ext cx="12192000" cy="6858000"/>
+          </a:xfrm>
+          <a:prstGeom prst="rect">
+            <a:avLst/>
+          </a:prstGeom>
+          <a:ln>
+            <a:noFill/>
+          </a:ln>
+        </p:spPr>
+        <p:style>
+          <a:lnRef idx="2">
+            <a:schemeClr val="accent1">
+              <a:shade val="50000"/>
+            </a:schemeClr>
+          </a:lnRef>
+          <a:fillRef idx="1003">
+            <a:schemeClr val="dk2"/>
+          </a:fillRef>
+          <a:effectRef idx="0">
+            <a:schemeClr val="accent1"/>
+          </a:effectRef>
+          <a:fontRef idx="minor">
+            <a:schemeClr val="lt1"/>
+          </a:fontRef>
+        </p:style>
+        <p:txBody>
+          <a:bodyPr rtlCol="0" anchor="ctr"/>
+          <a:lstStyle/>
+          <a:p>
+            <a:pPr algn="ctr"/>
+            <a:endParaRPr lang="en-US"/>
+          </a:p>
+        </p:txBody>
+      </p:sp>
+      <p:sp>
+        <p:nvSpPr>
+          <p:cNvPr id="3" name="Title 2">
+            <a:extLst>
+              <a:ext uri="{FF2B5EF4-FFF2-40B4-BE49-F238E27FC236}">
+                <a16:creationId xmlns:a16="http://schemas.microsoft.com/office/drawing/2014/main" id="{585BE8AC-7C70-DFA1-EE3F-FA4E60F52E2D}"/>
+              </a:ext>
+            </a:extLst>
+          </p:cNvPr>
+          <p:cNvSpPr>
+            <a:spLocks noGrp="1"/>
+          </p:cNvSpPr>
+          <p:nvPr>
+            <p:ph type="title"/>
+          </p:nvPr>
+        </p:nvSpPr>
+        <p:spPr>
+          <a:xfrm>
+            <a:off x="2801180" y="296216"/>
+            <a:ext cx="1711437" cy="289771"/>
+          </a:xfrm>
+        </p:spPr>
+        <p:txBody>
+          <a:bodyPr vert="horz" lIns="91440" tIns="45720" rIns="91440" bIns="45720" rtlCol="0" anchor="ctr">
+            <a:noAutofit/>
+          </a:bodyPr>
+          <a:lstStyle/>
+          <a:p>
+            <a:r>
+              <a:rPr lang="en-US" sz="2200" dirty="0">
+                <a:solidFill>
+                  <a:srgbClr val="FFFFFF"/>
+                </a:solidFill>
+              </a:rPr>
+              <a:t>US Map</a:t>
+            </a:r>
+          </a:p>
+        </p:txBody>
+      </p:sp>
+      <p:sp>
+        <p:nvSpPr>
+          <p:cNvPr id="13" name="Rectangle 12">
+            <a:extLst>
+              <a:ext uri="{FF2B5EF4-FFF2-40B4-BE49-F238E27FC236}">
+                <a16:creationId xmlns:a16="http://schemas.microsoft.com/office/drawing/2014/main" id="{57B113FE-00ED-4DFD-B853-285DBAE33FCF}"/>
+              </a:ext>
+              <a:ext uri="{C183D7F6-B498-43B3-948B-1728B52AA6E4}">
+                <adec:decorative xmlns:adec="http://schemas.microsoft.com/office/drawing/2017/decorative" val="1"/>
+              </a:ext>
+            </a:extLst>
+          </p:cNvPr>
+          <p:cNvSpPr>
+            <a:spLocks noGrp="1" noRot="1" noChangeAspect="1" noMove="1" noResize="1" noEditPoints="1" noAdjustHandles="1" noChangeArrowheads="1" noChangeShapeType="1" noTextEdit="1"/>
+          </p:cNvSpPr>
+          <p:nvPr>
+            <p:extLst>
+              <p:ext uri="{386F3935-93C4-4BCD-93E2-E3B085C9AB24}">
+                <p16:designElem xmlns:p16="http://schemas.microsoft.com/office/powerpoint/2015/main" val="1"/>
+              </p:ext>
+            </p:extLst>
+          </p:nvPr>
+        </p:nvSpPr>
+        <p:spPr>
+          <a:xfrm>
+            <a:off x="752475" y="733425"/>
+            <a:ext cx="6696075" cy="5391150"/>
+          </a:xfrm>
+          <a:prstGeom prst="rect">
+            <a:avLst/>
+          </a:prstGeom>
+          <a:solidFill>
+            <a:schemeClr val="bg1"/>
+          </a:solidFill>
+          <a:ln w="190500" cap="sq">
+            <a:solidFill>
+              <a:schemeClr val="bg1"/>
+            </a:solidFill>
+            <a:miter lim="800000"/>
+          </a:ln>
+          <a:effectLst>
+            <a:outerShdw blurRad="54991" dist="17780" dir="5400000" algn="ctr" rotWithShape="0">
+              <a:schemeClr val="bg1">
+                <a:alpha val="40000"/>
+              </a:schemeClr>
+            </a:outerShdw>
+          </a:effectLst>
+          <a:scene3d>
+            <a:camera prst="orthographicFront"/>
+            <a:lightRig rig="twoPt" dir="t">
+              <a:rot lat="0" lon="0" rev="7200000"/>
+            </a:lightRig>
+          </a:scene3d>
+          <a:sp3d>
+            <a:bevelT w="25400" h="19050"/>
+          </a:sp3d>
+        </p:spPr>
+        <p:style>
+          <a:lnRef idx="2">
+            <a:schemeClr val="accent1">
+              <a:shade val="50000"/>
+            </a:schemeClr>
+          </a:lnRef>
+          <a:fillRef idx="1">
+            <a:schemeClr val="accent1"/>
+          </a:fillRef>
+          <a:effectRef idx="0">
+            <a:schemeClr val="accent1"/>
+          </a:effectRef>
+          <a:fontRef idx="minor">
+            <a:schemeClr val="lt1"/>
+          </a:fontRef>
+        </p:style>
+        <p:txBody>
+          <a:bodyPr rtlCol="0" anchor="ctr"/>
+          <a:lstStyle/>
+          <a:p>
+            <a:pPr algn="ctr"/>
+            <a:endParaRPr lang="en-US"/>
+          </a:p>
+        </p:txBody>
+      </p:sp>
+      <p:pic>
+        <p:nvPicPr>
+          <p:cNvPr id="6" name="Content Placeholder 5">
+            <a:extLst>
+              <a:ext uri="{FF2B5EF4-FFF2-40B4-BE49-F238E27FC236}">
+                <a16:creationId xmlns:a16="http://schemas.microsoft.com/office/drawing/2014/main" id="{1597F5C0-22EE-AC6F-2993-9E93C3E27007}"/>
+              </a:ext>
+            </a:extLst>
+          </p:cNvPr>
+          <p:cNvPicPr>
+            <a:picLocks noGrp="1" noChangeAspect="1"/>
+          </p:cNvPicPr>
+          <p:nvPr>
+            <p:ph sz="half" idx="1"/>
+          </p:nvPr>
+        </p:nvPicPr>
+        <p:blipFill>
+          <a:blip r:embed="rId2"/>
+          <a:stretch>
+            <a:fillRect/>
+          </a:stretch>
+        </p:blipFill>
+        <p:spPr>
+          <a:xfrm>
+            <a:off x="1137490" y="1577111"/>
+            <a:ext cx="5914861" cy="3696788"/>
+          </a:xfrm>
+          <a:prstGeom prst="rect">
+            <a:avLst/>
+          </a:prstGeom>
+        </p:spPr>
+      </p:pic>
+      <p:sp>
+        <p:nvSpPr>
+          <p:cNvPr id="15" name="Rectangle 14">
+            <a:extLst>
+              <a:ext uri="{FF2B5EF4-FFF2-40B4-BE49-F238E27FC236}">
+                <a16:creationId xmlns:a16="http://schemas.microsoft.com/office/drawing/2014/main" id="{08CC676F-74F1-441D-9B51-42C5B87F182C}"/>
+              </a:ext>
+              <a:ext uri="{C183D7F6-B498-43B3-948B-1728B52AA6E4}">
+                <adec:decorative xmlns:adec="http://schemas.microsoft.com/office/drawing/2017/decorative" val="1"/>
+              </a:ext>
+            </a:extLst>
+          </p:cNvPr>
+          <p:cNvSpPr>
+            <a:spLocks noGrp="1" noRot="1" noChangeAspect="1" noMove="1" noResize="1" noEditPoints="1" noAdjustHandles="1" noChangeArrowheads="1" noChangeShapeType="1" noTextEdit="1"/>
+          </p:cNvSpPr>
+          <p:nvPr>
+            <p:extLst>
+              <p:ext uri="{386F3935-93C4-4BCD-93E2-E3B085C9AB24}">
+                <p16:designElem xmlns:p16="http://schemas.microsoft.com/office/powerpoint/2015/main" val="1"/>
+              </p:ext>
+            </p:extLst>
+          </p:nvPr>
+        </p:nvSpPr>
+        <p:spPr>
+          <a:xfrm>
+            <a:off x="817654" y="799817"/>
+            <a:ext cx="6565717" cy="5258367"/>
+          </a:xfrm>
+          <a:prstGeom prst="rect">
+            <a:avLst/>
+          </a:prstGeom>
+          <a:noFill/>
+          <a:ln w="12700">
+            <a:solidFill>
+              <a:srgbClr val="2A5B7F"/>
+            </a:solidFill>
+          </a:ln>
+        </p:spPr>
+        <p:style>
+          <a:lnRef idx="2">
+            <a:schemeClr val="accent1">
+              <a:shade val="50000"/>
+            </a:schemeClr>
+          </a:lnRef>
+          <a:fillRef idx="1">
+            <a:schemeClr val="accent1"/>
+          </a:fillRef>
+          <a:effectRef idx="0">
+            <a:schemeClr val="accent1"/>
+          </a:effectRef>
+          <a:fontRef idx="minor">
+            <a:schemeClr val="lt1"/>
+          </a:fontRef>
+        </p:style>
+        <p:txBody>
+          <a:bodyPr rtlCol="0" anchor="ctr"/>
+          <a:lstStyle/>
+          <a:p>
+            <a:pPr algn="ctr"/>
+            <a:endParaRPr lang="en-US"/>
+          </a:p>
+        </p:txBody>
+      </p:sp>
+      <p:sp>
+        <p:nvSpPr>
+          <p:cNvPr id="5" name="Content Placeholder 4">
+            <a:extLst>
+              <a:ext uri="{FF2B5EF4-FFF2-40B4-BE49-F238E27FC236}">
+                <a16:creationId xmlns:a16="http://schemas.microsoft.com/office/drawing/2014/main" id="{2E4A49F0-4F63-54F1-1689-0E58D6036870}"/>
+              </a:ext>
+            </a:extLst>
+          </p:cNvPr>
+          <p:cNvSpPr>
+            <a:spLocks noGrp="1"/>
+          </p:cNvSpPr>
+          <p:nvPr>
+            <p:ph sz="half" idx="2"/>
+          </p:nvPr>
+        </p:nvSpPr>
+        <p:spPr>
+          <a:xfrm>
+            <a:off x="7836793" y="656823"/>
+            <a:ext cx="3430763" cy="5556317"/>
+          </a:xfrm>
+        </p:spPr>
+        <p:txBody>
+          <a:bodyPr vert="horz" lIns="91440" tIns="45720" rIns="91440" bIns="45720" rtlCol="0">
+            <a:normAutofit/>
+          </a:bodyPr>
+          <a:lstStyle/>
+          <a:p>
+            <a:pPr marL="0" indent="0">
+              <a:buNone/>
+            </a:pPr>
+            <a:r>
+              <a:rPr lang="en-US" sz="1500" dirty="0">
+                <a:solidFill>
+                  <a:schemeClr val="bg1"/>
+                </a:solidFill>
+              </a:rPr>
+              <a:t>Unit of Analysis: Counties in USA </a:t>
+            </a:r>
+          </a:p>
+          <a:p>
+            <a:pPr marL="0" indent="0">
+              <a:buNone/>
+            </a:pPr>
+            <a:r>
+              <a:rPr lang="en-US" sz="1500" dirty="0">
+                <a:solidFill>
+                  <a:schemeClr val="bg1"/>
+                </a:solidFill>
+              </a:rPr>
+              <a:t>Counties: WA  - 39</a:t>
+            </a:r>
+          </a:p>
+          <a:p>
+            <a:pPr marL="0" indent="0">
+              <a:buNone/>
+            </a:pPr>
+            <a:r>
+              <a:rPr lang="en-US" sz="1500" dirty="0">
+                <a:solidFill>
+                  <a:schemeClr val="bg1"/>
+                </a:solidFill>
+              </a:rPr>
+              <a:t>Counties: NJ  - 21</a:t>
+            </a:r>
+          </a:p>
+          <a:p>
+            <a:pPr marL="0" indent="0">
+              <a:buNone/>
+            </a:pPr>
+            <a:r>
+              <a:rPr lang="en-US" sz="1500" dirty="0">
+                <a:solidFill>
+                  <a:schemeClr val="bg1"/>
+                </a:solidFill>
+              </a:rPr>
+              <a:t>Data </a:t>
+            </a:r>
+            <a:r>
+              <a:rPr lang="en-US" sz="1500" dirty="0" err="1">
+                <a:solidFill>
+                  <a:schemeClr val="bg1"/>
+                </a:solidFill>
+              </a:rPr>
+              <a:t>fron</a:t>
+            </a:r>
+            <a:r>
+              <a:rPr lang="en-US" sz="1500" dirty="0">
+                <a:solidFill>
+                  <a:schemeClr val="bg1"/>
+                </a:solidFill>
+              </a:rPr>
+              <a:t> year 2020 to 2022</a:t>
+            </a:r>
+          </a:p>
+          <a:p>
+            <a:pPr marL="0" indent="0">
+              <a:buNone/>
+            </a:pPr>
+            <a:endParaRPr lang="en-US" sz="1500" dirty="0">
+              <a:solidFill>
+                <a:schemeClr val="bg1"/>
+              </a:solidFill>
+            </a:endParaRPr>
+          </a:p>
+          <a:p>
+            <a:pPr marL="0" indent="0">
+              <a:buNone/>
+            </a:pPr>
+            <a:r>
+              <a:rPr lang="en-US" sz="1500" dirty="0">
+                <a:solidFill>
+                  <a:schemeClr val="bg1"/>
+                </a:solidFill>
+              </a:rPr>
+              <a:t>DV: availability of charging stations</a:t>
+            </a:r>
+          </a:p>
+          <a:p>
+            <a:pPr marL="0" indent="0">
+              <a:buNone/>
+            </a:pPr>
+            <a:r>
+              <a:rPr lang="en-US" sz="1500" dirty="0">
+                <a:solidFill>
+                  <a:schemeClr val="bg1"/>
+                </a:solidFill>
+              </a:rPr>
+              <a:t>Predictors (IV):  EV population, increased per capita income, larger population estimates, and lower unemployment rate</a:t>
+            </a:r>
+          </a:p>
+          <a:p>
+            <a:pPr marL="0" indent="0">
+              <a:buNone/>
+            </a:pPr>
+            <a:endParaRPr lang="en-US" sz="1500" dirty="0">
+              <a:solidFill>
+                <a:schemeClr val="bg1"/>
+              </a:solidFill>
+            </a:endParaRPr>
+          </a:p>
+          <a:p>
+            <a:pPr marL="0" indent="0">
+              <a:buNone/>
+            </a:pPr>
+            <a:r>
+              <a:rPr lang="en-US" sz="1500" dirty="0">
+                <a:solidFill>
+                  <a:schemeClr val="bg1"/>
+                </a:solidFill>
+              </a:rPr>
+              <a:t>Washington is about 9 times bigger than New Jersey.</a:t>
+            </a:r>
+          </a:p>
+          <a:p>
+            <a:pPr marL="0" indent="0">
+              <a:buNone/>
+            </a:pPr>
+            <a:r>
+              <a:rPr lang="en-US" sz="1500" dirty="0">
+                <a:solidFill>
+                  <a:schemeClr val="bg1"/>
+                </a:solidFill>
+              </a:rPr>
+              <a:t>New Jersey is 8.9% more expensive than Washington.</a:t>
+            </a:r>
+          </a:p>
+          <a:p>
+            <a:pPr marL="0" indent="0">
+              <a:buNone/>
+            </a:pPr>
+            <a:endParaRPr lang="en-US" sz="1500" dirty="0">
+              <a:solidFill>
+                <a:schemeClr val="bg1"/>
+              </a:solidFill>
+            </a:endParaRPr>
+          </a:p>
+        </p:txBody>
+      </p:sp>
+      <p:sp>
+        <p:nvSpPr>
+          <p:cNvPr id="7" name="TextBox 6">
+            <a:extLst>
+              <a:ext uri="{FF2B5EF4-FFF2-40B4-BE49-F238E27FC236}">
+                <a16:creationId xmlns:a16="http://schemas.microsoft.com/office/drawing/2014/main" id="{1105791B-D74A-C5E4-EBEA-C5B843DBDA93}"/>
+              </a:ext>
+            </a:extLst>
+          </p:cNvPr>
+          <p:cNvSpPr txBox="1"/>
+          <p:nvPr/>
+        </p:nvSpPr>
+        <p:spPr>
+          <a:xfrm>
+            <a:off x="784738" y="6213140"/>
+            <a:ext cx="2823881" cy="369332"/>
+          </a:xfrm>
+          <a:prstGeom prst="rect">
+            <a:avLst/>
+          </a:prstGeom>
+          <a:noFill/>
+        </p:spPr>
+        <p:txBody>
+          <a:bodyPr wrap="square" rtlCol="0">
+            <a:spAutoFit/>
+          </a:bodyPr>
+          <a:lstStyle/>
+          <a:p>
+            <a:r>
+              <a:rPr lang="en-US" sz="900" dirty="0">
+                <a:solidFill>
+                  <a:schemeClr val="bg1"/>
+                </a:solidFill>
+              </a:rPr>
+              <a:t>https://www.mylifeelsewhere.com/cost-of-living/washington-usa/new-jersey-usa</a:t>
+            </a:r>
+          </a:p>
+        </p:txBody>
+      </p:sp>
+      <p:sp>
+        <p:nvSpPr>
+          <p:cNvPr id="8" name="TextBox 7">
+            <a:extLst>
+              <a:ext uri="{FF2B5EF4-FFF2-40B4-BE49-F238E27FC236}">
+                <a16:creationId xmlns:a16="http://schemas.microsoft.com/office/drawing/2014/main" id="{E463C54E-A1C0-48AA-AE8D-D11DB5ED5B27}"/>
+              </a:ext>
+            </a:extLst>
+          </p:cNvPr>
+          <p:cNvSpPr txBox="1"/>
+          <p:nvPr/>
+        </p:nvSpPr>
+        <p:spPr>
+          <a:xfrm>
+            <a:off x="3721995" y="6213140"/>
+            <a:ext cx="3786586" cy="338554"/>
+          </a:xfrm>
+          <a:prstGeom prst="rect">
+            <a:avLst/>
+          </a:prstGeom>
+          <a:noFill/>
+        </p:spPr>
+        <p:txBody>
+          <a:bodyPr wrap="square" rtlCol="0">
+            <a:spAutoFit/>
+          </a:bodyPr>
+          <a:lstStyle/>
+          <a:p>
+            <a:r>
+              <a:rPr lang="en-US" sz="800" dirty="0">
+                <a:solidFill>
+                  <a:schemeClr val="bg1"/>
+                </a:solidFill>
+              </a:rPr>
+              <a:t>https://www.fla-shop.com/visited-states/?st=NJ%2CWA&amp;vc=1ca032&amp;uc=90cfea&amp;hc=40bfa6&amp;bc=ffffff&amp;sl=on</a:t>
+            </a:r>
+          </a:p>
+        </p:txBody>
+      </p:sp>
+    </p:spTree>
+    <p:extLst>
+      <p:ext uri="{BB962C8B-B14F-4D97-AF65-F5344CB8AC3E}">
+        <p14:creationId xmlns:p14="http://schemas.microsoft.com/office/powerpoint/2010/main" val="221288088"/>
+      </p:ext>
+    </p:extLst>
+  </p:cSld>
+  <p:clrMapOvr>
+    <a:overrideClrMapping bg1="lt1" tx1="dk1" bg2="lt2" tx2="dk2" accent1="accent1" accent2="accent2" accent3="accent3" accent4="accent4" accent5="accent5" accent6="accent6" hlink="hlink" folHlink="folHlink"/>
+  </p:clrMapOvr>
 </p:sld>
 </file>
 

</xml_diff>